<commit_message>
Updates for week 3
</commit_message>
<xml_diff>
--- a/Week3/BESD Week 3.pptx
+++ b/Week3/BESD Week 3.pptx
@@ -129,7 +129,7 @@
 <file path=ppt/revisionInfo.xml><?xml version="1.0" encoding="utf-8"?>
 <p1510:revInfo xmlns:a="http://schemas.openxmlformats.org/drawingml/2006/main" xmlns:r="http://schemas.openxmlformats.org/officeDocument/2006/relationships" xmlns:p1510="http://schemas.microsoft.com/office/powerpoint/2015/10/main">
   <p1510:revLst>
-    <p1510:client id="{CEAAE73E-A3C0-4EF3-8264-4F08772B5760}" v="16" dt="2023-03-20T04:35:28.913"/>
+    <p1510:client id="{CEAAE73E-A3C0-4EF3-8264-4F08772B5760}" v="20" dt="2023-03-21T22:58:11.487"/>
   </p1510:revLst>
 </p1510:revInfo>
 </file>
@@ -776,7 +776,7 @@
   <pc:docChgLst>
     <pc:chgData name="Chuck Kiefriter" userId="c57348f7-b440-4861-a58f-c89f414ea74a" providerId="ADAL" clId="{CEAAE73E-A3C0-4EF3-8264-4F08772B5760}"/>
     <pc:docChg chg="undo custSel addSld delSld modSld">
-      <pc:chgData name="Chuck Kiefriter" userId="c57348f7-b440-4861-a58f-c89f414ea74a" providerId="ADAL" clId="{CEAAE73E-A3C0-4EF3-8264-4F08772B5760}" dt="2023-03-20T04:42:51.356" v="756" actId="1076"/>
+      <pc:chgData name="Chuck Kiefriter" userId="c57348f7-b440-4861-a58f-c89f414ea74a" providerId="ADAL" clId="{CEAAE73E-A3C0-4EF3-8264-4F08772B5760}" dt="2023-03-21T23:02:03.008" v="988" actId="6549"/>
       <pc:docMkLst>
         <pc:docMk/>
       </pc:docMkLst>
@@ -1035,21 +1035,29 @@
         </pc:spChg>
       </pc:sldChg>
       <pc:sldChg chg="addSp delSp modSp mod">
-        <pc:chgData name="Chuck Kiefriter" userId="c57348f7-b440-4861-a58f-c89f414ea74a" providerId="ADAL" clId="{CEAAE73E-A3C0-4EF3-8264-4F08772B5760}" dt="2023-03-20T04:42:51.356" v="756" actId="1076"/>
+        <pc:chgData name="Chuck Kiefriter" userId="c57348f7-b440-4861-a58f-c89f414ea74a" providerId="ADAL" clId="{CEAAE73E-A3C0-4EF3-8264-4F08772B5760}" dt="2023-03-21T22:58:27.146" v="986" actId="1076"/>
         <pc:sldMkLst>
           <pc:docMk/>
           <pc:sldMk cId="3187156049" sldId="281"/>
         </pc:sldMkLst>
+        <pc:spChg chg="add del mod">
+          <ac:chgData name="Chuck Kiefriter" userId="c57348f7-b440-4861-a58f-c89f414ea74a" providerId="ADAL" clId="{CEAAE73E-A3C0-4EF3-8264-4F08772B5760}" dt="2023-03-21T22:58:23.744" v="985" actId="478"/>
+          <ac:spMkLst>
+            <pc:docMk/>
+            <pc:sldMk cId="3187156049" sldId="281"/>
+            <ac:spMk id="3" creationId="{B1BCC113-17B8-CD92-4AF4-0B14B609C3EC}"/>
+          </ac:spMkLst>
+        </pc:spChg>
         <pc:spChg chg="add mod">
-          <ac:chgData name="Chuck Kiefriter" userId="c57348f7-b440-4861-a58f-c89f414ea74a" providerId="ADAL" clId="{CEAAE73E-A3C0-4EF3-8264-4F08772B5760}" dt="2023-03-20T04:42:51.356" v="756" actId="1076"/>
+          <ac:chgData name="Chuck Kiefriter" userId="c57348f7-b440-4861-a58f-c89f414ea74a" providerId="ADAL" clId="{CEAAE73E-A3C0-4EF3-8264-4F08772B5760}" dt="2023-03-21T22:53:21.514" v="780" actId="1076"/>
           <ac:spMkLst>
             <pc:docMk/>
             <pc:sldMk cId="3187156049" sldId="281"/>
             <ac:spMk id="4" creationId="{5F4890C8-248C-DE3F-EFBE-A4EB3744954C}"/>
           </ac:spMkLst>
         </pc:spChg>
-        <pc:spChg chg="mod">
-          <ac:chgData name="Chuck Kiefriter" userId="c57348f7-b440-4861-a58f-c89f414ea74a" providerId="ADAL" clId="{CEAAE73E-A3C0-4EF3-8264-4F08772B5760}" dt="2023-03-20T04:35:14.507" v="751"/>
+        <pc:spChg chg="del mod">
+          <ac:chgData name="Chuck Kiefriter" userId="c57348f7-b440-4861-a58f-c89f414ea74a" providerId="ADAL" clId="{CEAAE73E-A3C0-4EF3-8264-4F08772B5760}" dt="2023-03-21T22:44:00.025" v="764" actId="478"/>
           <ac:spMkLst>
             <pc:docMk/>
             <pc:sldMk cId="3187156049" sldId="281"/>
@@ -1062,6 +1070,38 @@
             <pc:docMk/>
             <pc:sldMk cId="3187156049" sldId="281"/>
             <ac:spMk id="6" creationId="{59E906CD-110B-9D01-732C-2F21759B0265}"/>
+          </ac:spMkLst>
+        </pc:spChg>
+        <pc:spChg chg="add mod">
+          <ac:chgData name="Chuck Kiefriter" userId="c57348f7-b440-4861-a58f-c89f414ea74a" providerId="ADAL" clId="{CEAAE73E-A3C0-4EF3-8264-4F08772B5760}" dt="2023-03-21T22:54:53.559" v="895" actId="1076"/>
+          <ac:spMkLst>
+            <pc:docMk/>
+            <pc:sldMk cId="3187156049" sldId="281"/>
+            <ac:spMk id="8" creationId="{C70D9D43-254A-0545-002D-C444DCDB15AD}"/>
+          </ac:spMkLst>
+        </pc:spChg>
+        <pc:spChg chg="add del">
+          <ac:chgData name="Chuck Kiefriter" userId="c57348f7-b440-4861-a58f-c89f414ea74a" providerId="ADAL" clId="{CEAAE73E-A3C0-4EF3-8264-4F08772B5760}" dt="2023-03-21T22:52:46.609" v="772"/>
+          <ac:spMkLst>
+            <pc:docMk/>
+            <pc:sldMk cId="3187156049" sldId="281"/>
+            <ac:spMk id="9" creationId="{D91EFD97-7B32-CAFA-DA27-56C69DD1B8B9}"/>
+          </ac:spMkLst>
+        </pc:spChg>
+        <pc:spChg chg="add mod">
+          <ac:chgData name="Chuck Kiefriter" userId="c57348f7-b440-4861-a58f-c89f414ea74a" providerId="ADAL" clId="{CEAAE73E-A3C0-4EF3-8264-4F08772B5760}" dt="2023-03-21T22:57:14.137" v="981" actId="1076"/>
+          <ac:spMkLst>
+            <pc:docMk/>
+            <pc:sldMk cId="3187156049" sldId="281"/>
+            <ac:spMk id="11" creationId="{FBFF1272-6FED-ACD0-CEF8-E11B1DD3B48B}"/>
+          </ac:spMkLst>
+        </pc:spChg>
+        <pc:spChg chg="add mod">
+          <ac:chgData name="Chuck Kiefriter" userId="c57348f7-b440-4861-a58f-c89f414ea74a" providerId="ADAL" clId="{CEAAE73E-A3C0-4EF3-8264-4F08772B5760}" dt="2023-03-21T22:58:27.146" v="986" actId="1076"/>
+          <ac:spMkLst>
+            <pc:docMk/>
+            <pc:sldMk cId="3187156049" sldId="281"/>
+            <ac:spMk id="13" creationId="{54490E19-5FDF-8610-D214-65ABB5B29ACD}"/>
           </ac:spMkLst>
         </pc:spChg>
         <pc:picChg chg="del">
@@ -1089,13 +1129,13 @@
         </pc:spChg>
       </pc:sldChg>
       <pc:sldChg chg="delSp modSp mod">
-        <pc:chgData name="Chuck Kiefriter" userId="c57348f7-b440-4861-a58f-c89f414ea74a" providerId="ADAL" clId="{CEAAE73E-A3C0-4EF3-8264-4F08772B5760}" dt="2023-03-20T02:36:03.099" v="664"/>
+        <pc:chgData name="Chuck Kiefriter" userId="c57348f7-b440-4861-a58f-c89f414ea74a" providerId="ADAL" clId="{CEAAE73E-A3C0-4EF3-8264-4F08772B5760}" dt="2023-03-21T23:02:03.008" v="988" actId="6549"/>
         <pc:sldMkLst>
           <pc:docMk/>
           <pc:sldMk cId="1885158462" sldId="283"/>
         </pc:sldMkLst>
         <pc:spChg chg="mod">
-          <ac:chgData name="Chuck Kiefriter" userId="c57348f7-b440-4861-a58f-c89f414ea74a" providerId="ADAL" clId="{CEAAE73E-A3C0-4EF3-8264-4F08772B5760}" dt="2023-03-20T02:36:03.099" v="664"/>
+          <ac:chgData name="Chuck Kiefriter" userId="c57348f7-b440-4861-a58f-c89f414ea74a" providerId="ADAL" clId="{CEAAE73E-A3C0-4EF3-8264-4F08772B5760}" dt="2023-03-21T23:02:03.008" v="988" actId="6549"/>
           <ac:spMkLst>
             <pc:docMk/>
             <pc:sldMk cId="1885158462" sldId="283"/>
@@ -1387,7 +1427,7 @@
           <a:p>
             <a:fld id="{33D569A9-A222-4DCC-AF28-BB813B4F2ABB}" type="datetimeFigureOut">
               <a:rPr lang="en-US" smtClean="0"/>
-              <a:t>3/20/2023</a:t>
+              <a:t>3/21/2023</a:t>
             </a:fld>
             <a:endParaRPr lang="en-US"/>
           </a:p>
@@ -1675,7 +1715,7 @@
           <a:p>
             <a:fld id="{33D569A9-A222-4DCC-AF28-BB813B4F2ABB}" type="datetimeFigureOut">
               <a:rPr lang="en-US" smtClean="0"/>
-              <a:t>3/20/2023</a:t>
+              <a:t>3/21/2023</a:t>
             </a:fld>
             <a:endParaRPr lang="en-US"/>
           </a:p>
@@ -1873,7 +1913,7 @@
           <a:p>
             <a:fld id="{33D569A9-A222-4DCC-AF28-BB813B4F2ABB}" type="datetimeFigureOut">
               <a:rPr lang="en-US" smtClean="0"/>
-              <a:t>3/20/2023</a:t>
+              <a:t>3/21/2023</a:t>
             </a:fld>
             <a:endParaRPr lang="en-US"/>
           </a:p>
@@ -2081,7 +2121,7 @@
           <a:p>
             <a:fld id="{33D569A9-A222-4DCC-AF28-BB813B4F2ABB}" type="datetimeFigureOut">
               <a:rPr lang="en-US" smtClean="0"/>
-              <a:t>3/20/2023</a:t>
+              <a:t>3/21/2023</a:t>
             </a:fld>
             <a:endParaRPr lang="en-US"/>
           </a:p>
@@ -2279,7 +2319,7 @@
           <a:p>
             <a:fld id="{33D569A9-A222-4DCC-AF28-BB813B4F2ABB}" type="datetimeFigureOut">
               <a:rPr lang="en-US" smtClean="0"/>
-              <a:t>3/20/2023</a:t>
+              <a:t>3/21/2023</a:t>
             </a:fld>
             <a:endParaRPr lang="en-US"/>
           </a:p>
@@ -2554,7 +2594,7 @@
           <a:p>
             <a:fld id="{33D569A9-A222-4DCC-AF28-BB813B4F2ABB}" type="datetimeFigureOut">
               <a:rPr lang="en-US" smtClean="0"/>
-              <a:t>3/20/2023</a:t>
+              <a:t>3/21/2023</a:t>
             </a:fld>
             <a:endParaRPr lang="en-US"/>
           </a:p>
@@ -2819,7 +2859,7 @@
           <a:p>
             <a:fld id="{33D569A9-A222-4DCC-AF28-BB813B4F2ABB}" type="datetimeFigureOut">
               <a:rPr lang="en-US" smtClean="0"/>
-              <a:t>3/20/2023</a:t>
+              <a:t>3/21/2023</a:t>
             </a:fld>
             <a:endParaRPr lang="en-US"/>
           </a:p>
@@ -3231,7 +3271,7 @@
           <a:p>
             <a:fld id="{33D569A9-A222-4DCC-AF28-BB813B4F2ABB}" type="datetimeFigureOut">
               <a:rPr lang="en-US" smtClean="0"/>
-              <a:t>3/20/2023</a:t>
+              <a:t>3/21/2023</a:t>
             </a:fld>
             <a:endParaRPr lang="en-US"/>
           </a:p>
@@ -3372,7 +3412,7 @@
           <a:p>
             <a:fld id="{33D569A9-A222-4DCC-AF28-BB813B4F2ABB}" type="datetimeFigureOut">
               <a:rPr lang="en-US" smtClean="0"/>
-              <a:t>3/20/2023</a:t>
+              <a:t>3/21/2023</a:t>
             </a:fld>
             <a:endParaRPr lang="en-US"/>
           </a:p>
@@ -3485,7 +3525,7 @@
           <a:p>
             <a:fld id="{33D569A9-A222-4DCC-AF28-BB813B4F2ABB}" type="datetimeFigureOut">
               <a:rPr lang="en-US" smtClean="0"/>
-              <a:t>3/20/2023</a:t>
+              <a:t>3/21/2023</a:t>
             </a:fld>
             <a:endParaRPr lang="en-US"/>
           </a:p>
@@ -3831,7 +3871,7 @@
           <a:p>
             <a:fld id="{33D569A9-A222-4DCC-AF28-BB813B4F2ABB}" type="datetimeFigureOut">
               <a:rPr lang="en-US" smtClean="0"/>
-              <a:t>3/20/2023</a:t>
+              <a:t>3/21/2023</a:t>
             </a:fld>
             <a:endParaRPr lang="en-US"/>
           </a:p>
@@ -4072,7 +4112,7 @@
           <a:p>
             <a:fld id="{33D569A9-A222-4DCC-AF28-BB813B4F2ABB}" type="datetimeFigureOut">
               <a:rPr lang="en-US" smtClean="0"/>
-              <a:t>3/20/2023</a:t>
+              <a:t>3/21/2023</a:t>
             </a:fld>
             <a:endParaRPr lang="en-US"/>
           </a:p>
@@ -5002,77 +5042,6 @@
       </p:sp>
       <p:sp>
         <p:nvSpPr>
-          <p:cNvPr id="5" name="TextBox 4">
-            <a:extLst>
-              <a:ext uri="{FF2B5EF4-FFF2-40B4-BE49-F238E27FC236}">
-                <a16:creationId xmlns:a16="http://schemas.microsoft.com/office/drawing/2014/main" id="{9DB63145-E59C-9501-8AA5-4E6AC5C0D40F}"/>
-              </a:ext>
-            </a:extLst>
-          </p:cNvPr>
-          <p:cNvSpPr txBox="1"/>
-          <p:nvPr/>
-        </p:nvSpPr>
-        <p:spPr>
-          <a:xfrm>
-            <a:off x="341603" y="640071"/>
-            <a:ext cx="11628099" cy="646331"/>
-          </a:xfrm>
-          <a:prstGeom prst="rect">
-            <a:avLst/>
-          </a:prstGeom>
-          <a:noFill/>
-        </p:spPr>
-        <p:txBody>
-          <a:bodyPr wrap="square">
-            <a:spAutoFit/>
-          </a:bodyPr>
-          <a:lstStyle/>
-          <a:p>
-            <a:pPr marL="342900" indent="-342900">
-              <a:buFont typeface="Arial" panose="020B0604020202020204" pitchFamily="34" charset="0"/>
-              <a:buChar char="•"/>
-            </a:pPr>
-            <a:r>
-              <a:rPr lang="en-US" b="0" i="0" dirty="0">
-                <a:solidFill>
-                  <a:schemeClr val="tx1">
-                    <a:lumMod val="85000"/>
-                  </a:schemeClr>
-                </a:solidFill>
-                <a:effectLst/>
-                <a:latin typeface="Open Sans" panose="020B0606030504020204" pitchFamily="34" charset="0"/>
-                <a:ea typeface="Open Sans" panose="020B0606030504020204" pitchFamily="34" charset="0"/>
-                <a:cs typeface="Open Sans" panose="020B0606030504020204" pitchFamily="34" charset="0"/>
-              </a:rPr>
-              <a:t>TBD</a:t>
-            </a:r>
-            <a:endParaRPr lang="en-US" dirty="0">
-              <a:solidFill>
-                <a:schemeClr val="tx1">
-                  <a:lumMod val="85000"/>
-                </a:schemeClr>
-              </a:solidFill>
-              <a:latin typeface="Open Sans" panose="020B0606030504020204" pitchFamily="34" charset="0"/>
-            </a:endParaRPr>
-          </a:p>
-          <a:p>
-            <a:pPr marL="342900" indent="-342900">
-              <a:buFont typeface="Arial" panose="020B0604020202020204" pitchFamily="34" charset="0"/>
-              <a:buChar char="•"/>
-            </a:pPr>
-            <a:endParaRPr lang="en-US" dirty="0">
-              <a:solidFill>
-                <a:schemeClr val="tx1">
-                  <a:lumMod val="85000"/>
-                </a:schemeClr>
-              </a:solidFill>
-              <a:latin typeface="Open Sans" panose="020B0606030504020204" pitchFamily="34" charset="0"/>
-            </a:endParaRPr>
-          </a:p>
-        </p:txBody>
-      </p:sp>
-      <p:sp>
-        <p:nvSpPr>
           <p:cNvPr id="4" name="TextBox 3">
             <a:extLst>
               <a:ext uri="{FF2B5EF4-FFF2-40B4-BE49-F238E27FC236}">
@@ -5085,7 +5054,7 @@
         </p:nvSpPr>
         <p:spPr>
           <a:xfrm>
-            <a:off x="3744113" y="6162927"/>
+            <a:off x="3920195" y="6082018"/>
             <a:ext cx="8447887" cy="400110"/>
           </a:xfrm>
           <a:prstGeom prst="rect">
@@ -5106,6 +5075,526 @@
               <a:t>https://www.oracle.com/technical-resources/articles/java/javadoc-tool.html</a:t>
             </a:r>
             <a:endParaRPr lang="en-US" sz="2000" dirty="0"/>
+          </a:p>
+        </p:txBody>
+      </p:sp>
+      <p:sp>
+        <p:nvSpPr>
+          <p:cNvPr id="8" name="TextBox 7">
+            <a:extLst>
+              <a:ext uri="{FF2B5EF4-FFF2-40B4-BE49-F238E27FC236}">
+                <a16:creationId xmlns:a16="http://schemas.microsoft.com/office/drawing/2014/main" id="{C70D9D43-254A-0545-002D-C444DCDB15AD}"/>
+              </a:ext>
+            </a:extLst>
+          </p:cNvPr>
+          <p:cNvSpPr txBox="1"/>
+          <p:nvPr/>
+        </p:nvSpPr>
+        <p:spPr>
+          <a:xfrm>
+            <a:off x="341603" y="438195"/>
+            <a:ext cx="11432807" cy="2308324"/>
+          </a:xfrm>
+          <a:prstGeom prst="rect">
+            <a:avLst/>
+          </a:prstGeom>
+          <a:noFill/>
+        </p:spPr>
+        <p:txBody>
+          <a:bodyPr wrap="square">
+            <a:spAutoFit/>
+          </a:bodyPr>
+          <a:lstStyle/>
+          <a:p>
+            <a:r>
+              <a:rPr lang="en-US" b="0" i="0" dirty="0">
+                <a:solidFill>
+                  <a:schemeClr val="tx1">
+                    <a:lumMod val="85000"/>
+                  </a:schemeClr>
+                </a:solidFill>
+                <a:effectLst/>
+                <a:latin typeface="Open Sans" panose="020B0606030504020204" pitchFamily="34" charset="0"/>
+                <a:ea typeface="Open Sans" panose="020B0606030504020204" pitchFamily="34" charset="0"/>
+                <a:cs typeface="Open Sans" panose="020B0606030504020204" pitchFamily="34" charset="0"/>
+              </a:rPr>
+              <a:t>Documenting your code is crucial to help others understand it, and even to remind yourself how your own older programs work. Unfortunately, </a:t>
+            </a:r>
+            <a:r>
+              <a:rPr lang="en-US" b="0" i="0" dirty="0">
+                <a:solidFill>
+                  <a:srgbClr val="00B0F0"/>
+                </a:solidFill>
+                <a:effectLst/>
+                <a:latin typeface="Open Sans" panose="020B0606030504020204" pitchFamily="34" charset="0"/>
+                <a:ea typeface="Open Sans" panose="020B0606030504020204" pitchFamily="34" charset="0"/>
+                <a:cs typeface="Open Sans" panose="020B0606030504020204" pitchFamily="34" charset="0"/>
+              </a:rPr>
+              <a:t>it is easy for most external documentation to become out of date </a:t>
+            </a:r>
+            <a:r>
+              <a:rPr lang="en-US" b="0" i="0" dirty="0">
+                <a:solidFill>
+                  <a:schemeClr val="tx1">
+                    <a:lumMod val="85000"/>
+                  </a:schemeClr>
+                </a:solidFill>
+                <a:effectLst/>
+                <a:latin typeface="Open Sans" panose="020B0606030504020204" pitchFamily="34" charset="0"/>
+                <a:ea typeface="Open Sans" panose="020B0606030504020204" pitchFamily="34" charset="0"/>
+                <a:cs typeface="Open Sans" panose="020B0606030504020204" pitchFamily="34" charset="0"/>
+              </a:rPr>
+              <a:t>as a program changes. </a:t>
+            </a:r>
+          </a:p>
+          <a:p>
+            <a:r>
+              <a:rPr lang="en-US" b="0" i="0" dirty="0">
+                <a:solidFill>
+                  <a:schemeClr val="tx1">
+                    <a:lumMod val="85000"/>
+                  </a:schemeClr>
+                </a:solidFill>
+                <a:effectLst/>
+                <a:latin typeface="Open Sans" panose="020B0606030504020204" pitchFamily="34" charset="0"/>
+                <a:ea typeface="Open Sans" panose="020B0606030504020204" pitchFamily="34" charset="0"/>
+                <a:cs typeface="Open Sans" panose="020B0606030504020204" pitchFamily="34" charset="0"/>
+              </a:rPr>
+              <a:t>For this reason, it is useful to </a:t>
+            </a:r>
+            <a:r>
+              <a:rPr lang="en-US" b="0" i="0" dirty="0">
+                <a:solidFill>
+                  <a:srgbClr val="00B0F0"/>
+                </a:solidFill>
+                <a:effectLst/>
+                <a:latin typeface="Open Sans" panose="020B0606030504020204" pitchFamily="34" charset="0"/>
+                <a:ea typeface="Open Sans" panose="020B0606030504020204" pitchFamily="34" charset="0"/>
+                <a:cs typeface="Open Sans" panose="020B0606030504020204" pitchFamily="34" charset="0"/>
+              </a:rPr>
+              <a:t>write documentation as comments in the code itself</a:t>
+            </a:r>
+            <a:r>
+              <a:rPr lang="en-US" b="0" i="0" dirty="0">
+                <a:solidFill>
+                  <a:schemeClr val="tx1">
+                    <a:lumMod val="85000"/>
+                  </a:schemeClr>
+                </a:solidFill>
+                <a:effectLst/>
+                <a:latin typeface="Open Sans" panose="020B0606030504020204" pitchFamily="34" charset="0"/>
+                <a:ea typeface="Open Sans" panose="020B0606030504020204" pitchFamily="34" charset="0"/>
+                <a:cs typeface="Open Sans" panose="020B0606030504020204" pitchFamily="34" charset="0"/>
+              </a:rPr>
+              <a:t>, where they can be easily updated with other changes. </a:t>
+            </a:r>
+            <a:r>
+              <a:rPr lang="en-US" b="0" i="0" dirty="0">
+                <a:solidFill>
+                  <a:srgbClr val="00B0F0"/>
+                </a:solidFill>
+                <a:effectLst/>
+                <a:latin typeface="Open Sans" panose="020B0606030504020204" pitchFamily="34" charset="0"/>
+                <a:ea typeface="Open Sans" panose="020B0606030504020204" pitchFamily="34" charset="0"/>
+                <a:cs typeface="Open Sans" panose="020B0606030504020204" pitchFamily="34" charset="0"/>
+              </a:rPr>
+              <a:t>Javadoc is a documentation tool </a:t>
+            </a:r>
+            <a:r>
+              <a:rPr lang="en-US" b="0" i="0" dirty="0">
+                <a:solidFill>
+                  <a:schemeClr val="tx1">
+                    <a:lumMod val="85000"/>
+                  </a:schemeClr>
+                </a:solidFill>
+                <a:effectLst/>
+                <a:latin typeface="Open Sans" panose="020B0606030504020204" pitchFamily="34" charset="0"/>
+                <a:ea typeface="Open Sans" panose="020B0606030504020204" pitchFamily="34" charset="0"/>
+                <a:cs typeface="Open Sans" panose="020B0606030504020204" pitchFamily="34" charset="0"/>
+              </a:rPr>
+              <a:t>which defines a standard format for such comments, and which can generate HTML files to view the documentation from a web </a:t>
+            </a:r>
+            <a:r>
+              <a:rPr lang="en-US" b="0" i="0" dirty="0" err="1">
+                <a:solidFill>
+                  <a:schemeClr val="tx1">
+                    <a:lumMod val="85000"/>
+                  </a:schemeClr>
+                </a:solidFill>
+                <a:effectLst/>
+                <a:latin typeface="Open Sans" panose="020B0606030504020204" pitchFamily="34" charset="0"/>
+                <a:ea typeface="Open Sans" panose="020B0606030504020204" pitchFamily="34" charset="0"/>
+                <a:cs typeface="Open Sans" panose="020B0606030504020204" pitchFamily="34" charset="0"/>
+              </a:rPr>
+              <a:t>broswer</a:t>
+            </a:r>
+            <a:r>
+              <a:rPr lang="en-US" b="0" i="0" dirty="0">
+                <a:solidFill>
+                  <a:schemeClr val="tx1">
+                    <a:lumMod val="85000"/>
+                  </a:schemeClr>
+                </a:solidFill>
+                <a:effectLst/>
+                <a:latin typeface="Open Sans" panose="020B0606030504020204" pitchFamily="34" charset="0"/>
+                <a:ea typeface="Open Sans" panose="020B0606030504020204" pitchFamily="34" charset="0"/>
+                <a:cs typeface="Open Sans" panose="020B0606030504020204" pitchFamily="34" charset="0"/>
+              </a:rPr>
+              <a:t>. (As an example, see Oracle's Javadoc documentation for the Java libraries </a:t>
+            </a:r>
+            <a:r>
+              <a:rPr lang="en-US" b="0" i="0" dirty="0">
+                <a:solidFill>
+                  <a:srgbClr val="000000"/>
+                </a:solidFill>
+                <a:effectLst/>
+                <a:latin typeface="Open Sans" panose="020B0606030504020204" pitchFamily="34" charset="0"/>
+                <a:ea typeface="Open Sans" panose="020B0606030504020204" pitchFamily="34" charset="0"/>
+                <a:cs typeface="Open Sans" panose="020B0606030504020204" pitchFamily="34" charset="0"/>
+              </a:rPr>
+              <a:t>at </a:t>
+            </a:r>
+            <a:r>
+              <a:rPr lang="en-US" b="0" i="0" dirty="0">
+                <a:effectLst/>
+                <a:latin typeface="Open Sans" panose="020B0606030504020204" pitchFamily="34" charset="0"/>
+                <a:ea typeface="Open Sans" panose="020B0606030504020204" pitchFamily="34" charset="0"/>
+                <a:cs typeface="Open Sans" panose="020B0606030504020204" pitchFamily="34" charset="0"/>
+                <a:hlinkClick r:id="rId3"/>
+              </a:rPr>
+              <a:t>http://download.oracle.com/javase/6/docs/api/</a:t>
+            </a:r>
+            <a:r>
+              <a:rPr lang="en-US" b="0" i="0" dirty="0">
+                <a:solidFill>
+                  <a:srgbClr val="000000"/>
+                </a:solidFill>
+                <a:effectLst/>
+                <a:latin typeface="Open Sans" panose="020B0606030504020204" pitchFamily="34" charset="0"/>
+                <a:ea typeface="Open Sans" panose="020B0606030504020204" pitchFamily="34" charset="0"/>
+                <a:cs typeface="Open Sans" panose="020B0606030504020204" pitchFamily="34" charset="0"/>
+              </a:rPr>
+              <a:t>.)</a:t>
+            </a:r>
+            <a:endParaRPr lang="en-US" dirty="0">
+              <a:latin typeface="Open Sans" panose="020B0606030504020204" pitchFamily="34" charset="0"/>
+              <a:ea typeface="Open Sans" panose="020B0606030504020204" pitchFamily="34" charset="0"/>
+              <a:cs typeface="Open Sans" panose="020B0606030504020204" pitchFamily="34" charset="0"/>
+            </a:endParaRPr>
+          </a:p>
+        </p:txBody>
+      </p:sp>
+      <p:sp>
+        <p:nvSpPr>
+          <p:cNvPr id="11" name="TextBox 10">
+            <a:extLst>
+              <a:ext uri="{FF2B5EF4-FFF2-40B4-BE49-F238E27FC236}">
+                <a16:creationId xmlns:a16="http://schemas.microsoft.com/office/drawing/2014/main" id="{FBFF1272-6FED-ACD0-CEF8-E11B1DD3B48B}"/>
+              </a:ext>
+            </a:extLst>
+          </p:cNvPr>
+          <p:cNvSpPr txBox="1"/>
+          <p:nvPr/>
+        </p:nvSpPr>
+        <p:spPr>
+          <a:xfrm>
+            <a:off x="341603" y="2763337"/>
+            <a:ext cx="10715087" cy="3354765"/>
+          </a:xfrm>
+          <a:prstGeom prst="rect">
+            <a:avLst/>
+          </a:prstGeom>
+          <a:noFill/>
+        </p:spPr>
+        <p:txBody>
+          <a:bodyPr wrap="square">
+            <a:spAutoFit/>
+          </a:bodyPr>
+          <a:lstStyle/>
+          <a:p>
+            <a:r>
+              <a:rPr lang="en-US" dirty="0">
+                <a:solidFill>
+                  <a:schemeClr val="tx1">
+                    <a:lumMod val="85000"/>
+                  </a:schemeClr>
+                </a:solidFill>
+                <a:latin typeface="Open Sans" panose="020B0606030504020204" pitchFamily="34" charset="0"/>
+                <a:ea typeface="Open Sans" panose="020B0606030504020204" pitchFamily="34" charset="0"/>
+                <a:cs typeface="Open Sans" panose="020B0606030504020204" pitchFamily="34" charset="0"/>
+              </a:rPr>
+              <a:t>/** Indicates </a:t>
+            </a:r>
+            <a:r>
+              <a:rPr lang="en-US" dirty="0" err="1">
+                <a:solidFill>
+                  <a:schemeClr val="tx1">
+                    <a:lumMod val="85000"/>
+                  </a:schemeClr>
+                </a:solidFill>
+                <a:latin typeface="Open Sans" panose="020B0606030504020204" pitchFamily="34" charset="0"/>
+                <a:ea typeface="Open Sans" panose="020B0606030504020204" pitchFamily="34" charset="0"/>
+                <a:cs typeface="Open Sans" panose="020B0606030504020204" pitchFamily="34" charset="0"/>
+              </a:rPr>
+              <a:t>JavaDoc</a:t>
+            </a:r>
+            <a:r>
+              <a:rPr lang="en-US" dirty="0">
+                <a:solidFill>
+                  <a:schemeClr val="tx1">
+                    <a:lumMod val="85000"/>
+                  </a:schemeClr>
+                </a:solidFill>
+                <a:latin typeface="Open Sans" panose="020B0606030504020204" pitchFamily="34" charset="0"/>
+                <a:ea typeface="Open Sans" panose="020B0606030504020204" pitchFamily="34" charset="0"/>
+                <a:cs typeface="Open Sans" panose="020B0606030504020204" pitchFamily="34" charset="0"/>
+              </a:rPr>
+              <a:t> comment */</a:t>
+            </a:r>
+          </a:p>
+          <a:p>
+            <a:r>
+              <a:rPr lang="en-US" dirty="0">
+                <a:solidFill>
+                  <a:schemeClr val="tx1">
+                    <a:lumMod val="85000"/>
+                  </a:schemeClr>
+                </a:solidFill>
+                <a:latin typeface="Open Sans" panose="020B0606030504020204" pitchFamily="34" charset="0"/>
+                <a:ea typeface="Open Sans" panose="020B0606030504020204" pitchFamily="34" charset="0"/>
+                <a:cs typeface="Open Sans" panose="020B0606030504020204" pitchFamily="34" charset="0"/>
+              </a:rPr>
+              <a:t>Use tags in comments to indicate </a:t>
+            </a:r>
+            <a:r>
+              <a:rPr lang="en-US" dirty="0" err="1">
+                <a:solidFill>
+                  <a:schemeClr val="tx1">
+                    <a:lumMod val="85000"/>
+                  </a:schemeClr>
+                </a:solidFill>
+                <a:latin typeface="Open Sans" panose="020B0606030504020204" pitchFamily="34" charset="0"/>
+                <a:ea typeface="Open Sans" panose="020B0606030504020204" pitchFamily="34" charset="0"/>
+                <a:cs typeface="Open Sans" panose="020B0606030504020204" pitchFamily="34" charset="0"/>
+              </a:rPr>
+              <a:t>JavaDoc</a:t>
+            </a:r>
+            <a:r>
+              <a:rPr lang="en-US" dirty="0">
+                <a:solidFill>
+                  <a:schemeClr val="tx1">
+                    <a:lumMod val="85000"/>
+                  </a:schemeClr>
+                </a:solidFill>
+                <a:latin typeface="Open Sans" panose="020B0606030504020204" pitchFamily="34" charset="0"/>
+                <a:ea typeface="Open Sans" panose="020B0606030504020204" pitchFamily="34" charset="0"/>
+                <a:cs typeface="Open Sans" panose="020B0606030504020204" pitchFamily="34" charset="0"/>
+              </a:rPr>
+              <a:t> parts</a:t>
+            </a:r>
+          </a:p>
+          <a:p>
+            <a:r>
+              <a:rPr lang="en-US" sz="1600" dirty="0">
+                <a:solidFill>
+                  <a:schemeClr val="tx1">
+                    <a:lumMod val="85000"/>
+                  </a:schemeClr>
+                </a:solidFill>
+                <a:latin typeface="Open Sans" panose="020B0606030504020204" pitchFamily="34" charset="0"/>
+                <a:ea typeface="Open Sans" panose="020B0606030504020204" pitchFamily="34" charset="0"/>
+                <a:cs typeface="Open Sans" panose="020B0606030504020204" pitchFamily="34" charset="0"/>
+              </a:rPr>
+              <a:t>@param – defines parameters for input</a:t>
+            </a:r>
+          </a:p>
+          <a:p>
+            <a:r>
+              <a:rPr lang="en-US" sz="1600" dirty="0">
+                <a:solidFill>
+                  <a:schemeClr val="tx1">
+                    <a:lumMod val="85000"/>
+                  </a:schemeClr>
+                </a:solidFill>
+                <a:latin typeface="Open Sans" panose="020B0606030504020204" pitchFamily="34" charset="0"/>
+                <a:ea typeface="Open Sans" panose="020B0606030504020204" pitchFamily="34" charset="0"/>
+                <a:cs typeface="Open Sans" panose="020B0606030504020204" pitchFamily="34" charset="0"/>
+              </a:rPr>
+              <a:t>@return – indicates what value and type are return from method call</a:t>
+            </a:r>
+          </a:p>
+          <a:p>
+            <a:r>
+              <a:rPr lang="en-US" sz="1600" dirty="0">
+                <a:solidFill>
+                  <a:schemeClr val="tx1">
+                    <a:lumMod val="85000"/>
+                  </a:schemeClr>
+                </a:solidFill>
+                <a:latin typeface="Open Sans" panose="020B0606030504020204" pitchFamily="34" charset="0"/>
+                <a:ea typeface="Open Sans" panose="020B0606030504020204" pitchFamily="34" charset="0"/>
+                <a:cs typeface="Open Sans" panose="020B0606030504020204" pitchFamily="34" charset="0"/>
+              </a:rPr>
+              <a:t>@author (classes and interfaces only, required)</a:t>
+            </a:r>
+          </a:p>
+          <a:p>
+            <a:r>
+              <a:rPr lang="en-US" sz="1600" dirty="0">
+                <a:solidFill>
+                  <a:schemeClr val="tx1">
+                    <a:lumMod val="85000"/>
+                  </a:schemeClr>
+                </a:solidFill>
+                <a:latin typeface="Open Sans" panose="020B0606030504020204" pitchFamily="34" charset="0"/>
+                <a:ea typeface="Open Sans" panose="020B0606030504020204" pitchFamily="34" charset="0"/>
+                <a:cs typeface="Open Sans" panose="020B0606030504020204" pitchFamily="34" charset="0"/>
+              </a:rPr>
+              <a:t>@version (classes and interfaces only, required. See footnote 1)</a:t>
+            </a:r>
+          </a:p>
+          <a:p>
+            <a:r>
+              <a:rPr lang="en-US" sz="1600" dirty="0">
+                <a:solidFill>
+                  <a:schemeClr val="tx1">
+                    <a:lumMod val="85000"/>
+                  </a:schemeClr>
+                </a:solidFill>
+                <a:latin typeface="Open Sans" panose="020B0606030504020204" pitchFamily="34" charset="0"/>
+                <a:ea typeface="Open Sans" panose="020B0606030504020204" pitchFamily="34" charset="0"/>
+                <a:cs typeface="Open Sans" panose="020B0606030504020204" pitchFamily="34" charset="0"/>
+              </a:rPr>
+              <a:t>@param (methods and constructors only)</a:t>
+            </a:r>
+          </a:p>
+          <a:p>
+            <a:r>
+              <a:rPr lang="en-US" sz="1600" dirty="0">
+                <a:solidFill>
+                  <a:schemeClr val="tx1">
+                    <a:lumMod val="85000"/>
+                  </a:schemeClr>
+                </a:solidFill>
+                <a:latin typeface="Open Sans" panose="020B0606030504020204" pitchFamily="34" charset="0"/>
+                <a:ea typeface="Open Sans" panose="020B0606030504020204" pitchFamily="34" charset="0"/>
+                <a:cs typeface="Open Sans" panose="020B0606030504020204" pitchFamily="34" charset="0"/>
+              </a:rPr>
+              <a:t>@return (methods only)</a:t>
+            </a:r>
+          </a:p>
+          <a:p>
+            <a:r>
+              <a:rPr lang="en-US" sz="1600" dirty="0">
+                <a:solidFill>
+                  <a:schemeClr val="tx1">
+                    <a:lumMod val="85000"/>
+                  </a:schemeClr>
+                </a:solidFill>
+                <a:latin typeface="Open Sans" panose="020B0606030504020204" pitchFamily="34" charset="0"/>
+                <a:ea typeface="Open Sans" panose="020B0606030504020204" pitchFamily="34" charset="0"/>
+                <a:cs typeface="Open Sans" panose="020B0606030504020204" pitchFamily="34" charset="0"/>
+              </a:rPr>
+              <a:t>@exception (@throws is a synonym added in Javadoc 1.2)</a:t>
+            </a:r>
+          </a:p>
+          <a:p>
+            <a:r>
+              <a:rPr lang="en-US" sz="1600" dirty="0">
+                <a:solidFill>
+                  <a:schemeClr val="tx1">
+                    <a:lumMod val="85000"/>
+                  </a:schemeClr>
+                </a:solidFill>
+                <a:latin typeface="Open Sans" panose="020B0606030504020204" pitchFamily="34" charset="0"/>
+                <a:ea typeface="Open Sans" panose="020B0606030504020204" pitchFamily="34" charset="0"/>
+                <a:cs typeface="Open Sans" panose="020B0606030504020204" pitchFamily="34" charset="0"/>
+              </a:rPr>
+              <a:t>@see</a:t>
+            </a:r>
+          </a:p>
+          <a:p>
+            <a:r>
+              <a:rPr lang="en-US" sz="1600" dirty="0">
+                <a:solidFill>
+                  <a:schemeClr val="tx1">
+                    <a:lumMod val="85000"/>
+                  </a:schemeClr>
+                </a:solidFill>
+                <a:latin typeface="Open Sans" panose="020B0606030504020204" pitchFamily="34" charset="0"/>
+                <a:ea typeface="Open Sans" panose="020B0606030504020204" pitchFamily="34" charset="0"/>
+                <a:cs typeface="Open Sans" panose="020B0606030504020204" pitchFamily="34" charset="0"/>
+              </a:rPr>
+              <a:t>@since</a:t>
+            </a:r>
+          </a:p>
+          <a:p>
+            <a:r>
+              <a:rPr lang="en-US" sz="1600" dirty="0">
+                <a:solidFill>
+                  <a:schemeClr val="tx1">
+                    <a:lumMod val="85000"/>
+                  </a:schemeClr>
+                </a:solidFill>
+                <a:latin typeface="Open Sans" panose="020B0606030504020204" pitchFamily="34" charset="0"/>
+                <a:ea typeface="Open Sans" panose="020B0606030504020204" pitchFamily="34" charset="0"/>
+                <a:cs typeface="Open Sans" panose="020B0606030504020204" pitchFamily="34" charset="0"/>
+              </a:rPr>
+              <a:t>@serial (or @serialField or @serialData)</a:t>
+            </a:r>
+          </a:p>
+          <a:p>
+            <a:r>
+              <a:rPr lang="en-US" sz="1600" dirty="0">
+                <a:solidFill>
+                  <a:schemeClr val="tx1">
+                    <a:lumMod val="85000"/>
+                  </a:schemeClr>
+                </a:solidFill>
+                <a:latin typeface="Open Sans" panose="020B0606030504020204" pitchFamily="34" charset="0"/>
+                <a:ea typeface="Open Sans" panose="020B0606030504020204" pitchFamily="34" charset="0"/>
+                <a:cs typeface="Open Sans" panose="020B0606030504020204" pitchFamily="34" charset="0"/>
+              </a:rPr>
+              <a:t>@deprecated (see How and When To Deprecate APIs)</a:t>
+            </a:r>
+          </a:p>
+        </p:txBody>
+      </p:sp>
+      <p:sp>
+        <p:nvSpPr>
+          <p:cNvPr id="13" name="TextBox 12">
+            <a:extLst>
+              <a:ext uri="{FF2B5EF4-FFF2-40B4-BE49-F238E27FC236}">
+                <a16:creationId xmlns:a16="http://schemas.microsoft.com/office/drawing/2014/main" id="{54490E19-5FDF-8610-D214-65ABB5B29ACD}"/>
+              </a:ext>
+            </a:extLst>
+          </p:cNvPr>
+          <p:cNvSpPr txBox="1"/>
+          <p:nvPr/>
+        </p:nvSpPr>
+        <p:spPr>
+          <a:xfrm>
+            <a:off x="3920195" y="6438127"/>
+            <a:ext cx="6581163" cy="369332"/>
+          </a:xfrm>
+          <a:prstGeom prst="rect">
+            <a:avLst/>
+          </a:prstGeom>
+          <a:noFill/>
+        </p:spPr>
+        <p:txBody>
+          <a:bodyPr wrap="square">
+            <a:spAutoFit/>
+          </a:bodyPr>
+          <a:lstStyle/>
+          <a:p>
+            <a:r>
+              <a:rPr lang="en-US" dirty="0">
+                <a:hlinkClick r:id="rId4"/>
+              </a:rPr>
+              <a:t>https://docs.oracle.com/javase/6/docs/api/java/util/Scanner.html</a:t>
+            </a:r>
+            <a:endParaRPr lang="en-US" dirty="0"/>
           </a:p>
         </p:txBody>
       </p:sp>
@@ -5334,7 +5823,7 @@
         <p:spPr>
           <a:xfrm>
             <a:off x="240935" y="539403"/>
-            <a:ext cx="11612709" cy="10618291"/>
+            <a:ext cx="11612709" cy="9510296"/>
           </a:xfrm>
           <a:prstGeom prst="rect">
             <a:avLst/>
@@ -5467,6 +5956,17 @@
               <a:buChar char="•"/>
             </a:pPr>
             <a:r>
+              <a:rPr lang="en-US">
+                <a:solidFill>
+                  <a:schemeClr val="tx1">
+                    <a:lumMod val="85000"/>
+                  </a:schemeClr>
+                </a:solidFill>
+                <a:latin typeface="Open Sans" panose="020B0606030504020204" pitchFamily="34" charset="0"/>
+              </a:rPr>
+              <a:t>Object </a:t>
+            </a:r>
+            <a:r>
               <a:rPr lang="en-US" dirty="0">
                 <a:solidFill>
                   <a:schemeClr val="tx1">
@@ -5475,97 +5975,7 @@
                 </a:solidFill>
                 <a:latin typeface="Open Sans" panose="020B0606030504020204" pitchFamily="34" charset="0"/>
               </a:rPr>
-              <a:t>int age1 = 21;</a:t>
-            </a:r>
-          </a:p>
-          <a:p>
-            <a:pPr marL="342900" indent="-342900">
-              <a:buFont typeface="Arial" panose="020B0604020202020204" pitchFamily="34" charset="0"/>
-              <a:buChar char="•"/>
-            </a:pPr>
-            <a:r>
-              <a:rPr lang="en-US" dirty="0">
-                <a:solidFill>
-                  <a:schemeClr val="tx1">
-                    <a:lumMod val="85000"/>
-                  </a:schemeClr>
-                </a:solidFill>
-                <a:latin typeface="Open Sans" panose="020B0606030504020204" pitchFamily="34" charset="0"/>
-              </a:rPr>
-              <a:t>int age2 = 21;</a:t>
-            </a:r>
-          </a:p>
-          <a:p>
-            <a:pPr marL="342900" indent="-342900">
-              <a:buFont typeface="Arial" panose="020B0604020202020204" pitchFamily="34" charset="0"/>
-              <a:buChar char="•"/>
-            </a:pPr>
-            <a:r>
-              <a:rPr lang="en-US" dirty="0" err="1">
-                <a:solidFill>
-                  <a:schemeClr val="tx1">
-                    <a:lumMod val="85000"/>
-                  </a:schemeClr>
-                </a:solidFill>
-                <a:latin typeface="Open Sans" panose="020B0606030504020204" pitchFamily="34" charset="0"/>
-              </a:rPr>
-              <a:t>System.out.println</a:t>
-            </a:r>
-            <a:r>
-              <a:rPr lang="en-US" dirty="0">
-                <a:solidFill>
-                  <a:schemeClr val="tx1">
-                    <a:lumMod val="85000"/>
-                  </a:schemeClr>
-                </a:solidFill>
-                <a:latin typeface="Open Sans" panose="020B0606030504020204" pitchFamily="34" charset="0"/>
-              </a:rPr>
-              <a:t>("age1 == age2: " + (age1 == age2));</a:t>
-            </a:r>
-          </a:p>
-          <a:p>
-            <a:pPr marL="342900" indent="-342900">
-              <a:buFont typeface="Arial" panose="020B0604020202020204" pitchFamily="34" charset="0"/>
-              <a:buChar char="•"/>
-            </a:pPr>
-            <a:endParaRPr lang="en-US" dirty="0">
-              <a:solidFill>
-                <a:schemeClr val="tx1">
-                  <a:lumMod val="85000"/>
-                </a:schemeClr>
-              </a:solidFill>
-              <a:latin typeface="Open Sans" panose="020B0606030504020204" pitchFamily="34" charset="0"/>
-            </a:endParaRPr>
-          </a:p>
-          <a:p>
-            <a:pPr marL="342900" indent="-342900">
-              <a:buFont typeface="Arial" panose="020B0604020202020204" pitchFamily="34" charset="0"/>
-              <a:buChar char="•"/>
-            </a:pPr>
-            <a:endParaRPr lang="en-US" dirty="0">
-              <a:solidFill>
-                <a:schemeClr val="tx1">
-                  <a:lumMod val="85000"/>
-                </a:schemeClr>
-              </a:solidFill>
-              <a:latin typeface="Open Sans" panose="020B0606030504020204" pitchFamily="34" charset="0"/>
-            </a:endParaRPr>
-          </a:p>
-          <a:p>
-            <a:pPr marL="342900" indent="-342900">
-              <a:buFont typeface="Arial" panose="020B0604020202020204" pitchFamily="34" charset="0"/>
-              <a:buChar char="•"/>
-            </a:pPr>
-            <a:r>
-              <a:rPr lang="en-US" dirty="0">
-                <a:solidFill>
-                  <a:schemeClr val="tx1">
-                    <a:lumMod val="85000"/>
-                  </a:schemeClr>
-                </a:solidFill>
-                <a:latin typeface="Open Sans" panose="020B0606030504020204" pitchFamily="34" charset="0"/>
-              </a:rPr>
-              <a:t>Object Equality</a:t>
+              <a:t>Equality</a:t>
             </a:r>
           </a:p>
           <a:p>

</xml_diff>